<commit_message>
added more slides. stats, ack's
</commit_message>
<xml_diff>
--- a/gitlab_embl/gitlab_at_embl.pptx
+++ b/gitlab_embl/gitlab_at_embl.pptx
@@ -5,14 +5,19 @@
     <p:sldMasterId id="2147483648" r:id="rId1"/>
   </p:sldMasterIdLst>
   <p:notesMasterIdLst>
-    <p:notesMasterId r:id="rId7"/>
+    <p:notesMasterId r:id="rId12"/>
   </p:notesMasterIdLst>
   <p:sldIdLst>
-    <p:sldId id="256" r:id="rId2"/>
-    <p:sldId id="257" r:id="rId3"/>
-    <p:sldId id="260" r:id="rId4"/>
-    <p:sldId id="259" r:id="rId5"/>
-    <p:sldId id="261" r:id="rId6"/>
+    <p:sldId id="266" r:id="rId2"/>
+    <p:sldId id="256" r:id="rId3"/>
+    <p:sldId id="257" r:id="rId4"/>
+    <p:sldId id="260" r:id="rId5"/>
+    <p:sldId id="262" r:id="rId6"/>
+    <p:sldId id="259" r:id="rId7"/>
+    <p:sldId id="261" r:id="rId8"/>
+    <p:sldId id="263" r:id="rId9"/>
+    <p:sldId id="264" r:id="rId10"/>
+    <p:sldId id="265" r:id="rId11"/>
   </p:sldIdLst>
   <p:sldSz cx="9144000" cy="6858000" type="screen4x3"/>
   <p:notesSz cx="6858000" cy="9144000"/>
@@ -584,7 +589,7 @@
           <a:p>
             <a:fld id="{4EF58CDD-399E-554E-95B8-D1A85A51BC00}" type="slidenum">
               <a:rPr lang="en-US" smtClean="0"/>
-              <a:t>2</a:t>
+              <a:t>3</a:t>
             </a:fld>
             <a:endParaRPr lang="en-US"/>
           </a:p>
@@ -742,7 +747,7 @@
           <a:p>
             <a:fld id="{4EF58CDD-399E-554E-95B8-D1A85A51BC00}" type="slidenum">
               <a:rPr lang="en-US" smtClean="0"/>
-              <a:t>3</a:t>
+              <a:t>4</a:t>
             </a:fld>
             <a:endParaRPr lang="en-US"/>
           </a:p>
@@ -3787,6 +3792,435 @@
           </a:p>
         </p:txBody>
       </p:sp>
+      <p:pic>
+        <p:nvPicPr>
+          <p:cNvPr id="4" name="Picture 3" descr="bsaG2ejh.jpg"/>
+          <p:cNvPicPr>
+            <a:picLocks noChangeAspect="1"/>
+          </p:cNvPicPr>
+          <p:nvPr/>
+        </p:nvPicPr>
+        <p:blipFill>
+          <a:blip r:embed="rId2">
+            <a:extLst>
+              <a:ext uri="{28A0092B-C50C-407E-A947-70E740481C1C}">
+                <a14:useLocalDpi xmlns:a14="http://schemas.microsoft.com/office/drawing/2010/main" val="0"/>
+              </a:ext>
+            </a:extLst>
+          </a:blip>
+          <a:stretch>
+            <a:fillRect/>
+          </a:stretch>
+        </p:blipFill>
+        <p:spPr>
+          <a:xfrm>
+            <a:off x="1970768" y="0"/>
+            <a:ext cx="5217170" cy="6858000"/>
+          </a:xfrm>
+          <a:prstGeom prst="rect">
+            <a:avLst/>
+          </a:prstGeom>
+        </p:spPr>
+      </p:pic>
+    </p:spTree>
+    <p:extLst>
+      <p:ext uri="{BB962C8B-B14F-4D97-AF65-F5344CB8AC3E}">
+        <p14:creationId xmlns:p14="http://schemas.microsoft.com/office/powerpoint/2010/main" val="2376446994"/>
+      </p:ext>
+    </p:extLst>
+  </p:cSld>
+  <p:clrMapOvr>
+    <a:masterClrMapping/>
+  </p:clrMapOvr>
+</p:sld>
+</file>
+
+<file path=ppt/slides/slide10.xml><?xml version="1.0" encoding="utf-8"?>
+<p:sld xmlns:a="http://schemas.openxmlformats.org/drawingml/2006/main" xmlns:r="http://schemas.openxmlformats.org/officeDocument/2006/relationships" xmlns:p="http://schemas.openxmlformats.org/presentationml/2006/main">
+  <p:cSld>
+    <p:spTree>
+      <p:nvGrpSpPr>
+        <p:cNvPr id="1" name=""/>
+        <p:cNvGrpSpPr/>
+        <p:nvPr/>
+      </p:nvGrpSpPr>
+      <p:grpSpPr>
+        <a:xfrm>
+          <a:off x="0" y="0"/>
+          <a:ext cx="0" cy="0"/>
+          <a:chOff x="0" y="0"/>
+          <a:chExt cx="0" cy="0"/>
+        </a:xfrm>
+      </p:grpSpPr>
+      <p:sp>
+        <p:nvSpPr>
+          <p:cNvPr id="2" name="Title 1"/>
+          <p:cNvSpPr>
+            <a:spLocks noGrp="1"/>
+          </p:cNvSpPr>
+          <p:nvPr>
+            <p:ph type="title"/>
+          </p:nvPr>
+        </p:nvSpPr>
+        <p:spPr/>
+        <p:txBody>
+          <a:bodyPr/>
+          <a:lstStyle/>
+          <a:p>
+            <a:r>
+              <a:rPr lang="en-US" dirty="0"/>
+              <a:t>Acknowledgements</a:t>
+            </a:r>
+          </a:p>
+        </p:txBody>
+      </p:sp>
+      <p:sp>
+        <p:nvSpPr>
+          <p:cNvPr id="4" name="Rectangle 3"/>
+          <p:cNvSpPr/>
+          <p:nvPr/>
+        </p:nvSpPr>
+        <p:spPr>
+          <a:xfrm>
+            <a:off x="1430422" y="2103710"/>
+            <a:ext cx="6400800" cy="2554545"/>
+          </a:xfrm>
+          <a:prstGeom prst="rect">
+            <a:avLst/>
+          </a:prstGeom>
+        </p:spPr>
+        <p:txBody>
+          <a:bodyPr wrap="square">
+            <a:spAutoFit/>
+          </a:bodyPr>
+          <a:lstStyle/>
+          <a:p>
+            <a:pPr marL="285750" indent="-285750">
+              <a:buFont typeface="Arial"/>
+              <a:buChar char="•"/>
+            </a:pPr>
+            <a:r>
+              <a:rPr lang="en-US" sz="2000" dirty="0" smtClean="0">
+                <a:solidFill>
+                  <a:srgbClr val="000000"/>
+                </a:solidFill>
+              </a:rPr>
+              <a:t> </a:t>
+            </a:r>
+            <a:r>
+              <a:rPr lang="en-US" sz="2000" dirty="0" smtClean="0">
+                <a:solidFill>
+                  <a:srgbClr val="008000"/>
+                </a:solidFill>
+              </a:rPr>
+              <a:t>Frank </a:t>
+            </a:r>
+            <a:r>
+              <a:rPr lang="en-US" sz="2000" dirty="0">
+                <a:solidFill>
+                  <a:srgbClr val="008000"/>
+                </a:solidFill>
+              </a:rPr>
+              <a:t>Thommen </a:t>
+            </a:r>
+            <a:r>
+              <a:rPr lang="en-US" sz="2000" dirty="0"/>
+              <a:t>(Structures IT Management &amp; Support</a:t>
+            </a:r>
+            <a:r>
+              <a:rPr lang="en-US" sz="2000" dirty="0" smtClean="0"/>
+              <a:t>)</a:t>
+            </a:r>
+          </a:p>
+          <a:p>
+            <a:pPr marL="285750" indent="-285750">
+              <a:buFont typeface="Arial"/>
+              <a:buChar char="•"/>
+            </a:pPr>
+            <a:endParaRPr lang="en-US" sz="2000" dirty="0" smtClean="0"/>
+          </a:p>
+          <a:p>
+            <a:pPr marL="285750" indent="-285750">
+              <a:buFont typeface="Arial"/>
+              <a:buChar char="•"/>
+            </a:pPr>
+            <a:r>
+              <a:rPr lang="en-US" sz="2000" dirty="0" smtClean="0">
+                <a:solidFill>
+                  <a:srgbClr val="000000"/>
+                </a:solidFill>
+              </a:rPr>
+              <a:t> </a:t>
+            </a:r>
+            <a:r>
+              <a:rPr lang="en-US" sz="2000" dirty="0" smtClean="0">
+                <a:solidFill>
+                  <a:srgbClr val="008000"/>
+                </a:solidFill>
+              </a:rPr>
+              <a:t>Michael </a:t>
+            </a:r>
+            <a:r>
+              <a:rPr lang="en-US" sz="2000" dirty="0" err="1">
+                <a:solidFill>
+                  <a:srgbClr val="008000"/>
+                </a:solidFill>
+              </a:rPr>
+              <a:t>Wahlers</a:t>
+            </a:r>
+            <a:r>
+              <a:rPr lang="en-US" sz="2000" dirty="0">
+                <a:solidFill>
+                  <a:srgbClr val="008000"/>
+                </a:solidFill>
+              </a:rPr>
+              <a:t> </a:t>
+            </a:r>
+            <a:r>
+              <a:rPr lang="en-US" sz="2000" dirty="0"/>
+              <a:t>and </a:t>
+            </a:r>
+            <a:r>
+              <a:rPr lang="en-US" sz="2000" dirty="0">
+                <a:solidFill>
+                  <a:srgbClr val="008000"/>
+                </a:solidFill>
+              </a:rPr>
+              <a:t>Carlos Fernandez San </a:t>
+            </a:r>
+            <a:r>
+              <a:rPr lang="en-US" sz="2000" dirty="0" err="1" smtClean="0">
+                <a:solidFill>
+                  <a:srgbClr val="008000"/>
+                </a:solidFill>
+              </a:rPr>
+              <a:t>Millan</a:t>
+            </a:r>
+            <a:endParaRPr lang="en-US" sz="2000" dirty="0" smtClean="0">
+              <a:solidFill>
+                <a:srgbClr val="008000"/>
+              </a:solidFill>
+            </a:endParaRPr>
+          </a:p>
+          <a:p>
+            <a:pPr marL="285750" indent="-285750">
+              <a:buFont typeface="Arial"/>
+              <a:buChar char="•"/>
+            </a:pPr>
+            <a:endParaRPr lang="en-US" sz="2000" dirty="0"/>
+          </a:p>
+          <a:p>
+            <a:pPr marL="285750" indent="-285750">
+              <a:buFont typeface="Arial"/>
+              <a:buChar char="•"/>
+            </a:pPr>
+            <a:r>
+              <a:rPr lang="en-US" sz="2000" dirty="0" smtClean="0"/>
+              <a:t> The </a:t>
+            </a:r>
+            <a:r>
+              <a:rPr lang="en-US" sz="2000" dirty="0"/>
+              <a:t>EMBL </a:t>
+            </a:r>
+            <a:r>
+              <a:rPr lang="en-US" sz="2000" dirty="0" err="1"/>
+              <a:t>Git</a:t>
+            </a:r>
+            <a:r>
+              <a:rPr lang="en-US" sz="2000" dirty="0"/>
+              <a:t> server is part of the </a:t>
+            </a:r>
+            <a:r>
+              <a:rPr lang="en-US" sz="2000" dirty="0">
+                <a:solidFill>
+                  <a:srgbClr val="008000"/>
+                </a:solidFill>
+              </a:rPr>
+              <a:t>Bio-IT Project</a:t>
+            </a:r>
+            <a:r>
+              <a:rPr lang="en-US" sz="2000" dirty="0" smtClean="0"/>
+              <a:t>.</a:t>
+            </a:r>
+          </a:p>
+          <a:p>
+            <a:pPr marL="285750" indent="-285750">
+              <a:buFont typeface="Arial"/>
+              <a:buChar char="•"/>
+            </a:pPr>
+            <a:endParaRPr lang="en-US" sz="2000" dirty="0"/>
+          </a:p>
+          <a:p>
+            <a:pPr marL="285750" indent="-285750">
+              <a:buFont typeface="Arial"/>
+              <a:buChar char="•"/>
+            </a:pPr>
+            <a:r>
+              <a:rPr lang="en-US" sz="2000" dirty="0" smtClean="0"/>
+              <a:t> The </a:t>
+            </a:r>
+            <a:r>
+              <a:rPr lang="en-US" sz="2000" dirty="0"/>
+              <a:t>server, disk space and backup are kindly provided </a:t>
+            </a:r>
+            <a:r>
+              <a:rPr lang="en-US" sz="2000" dirty="0" smtClean="0"/>
+              <a:t>by</a:t>
+            </a:r>
+            <a:br>
+              <a:rPr lang="en-US" sz="2000" dirty="0" smtClean="0"/>
+            </a:br>
+            <a:r>
+              <a:rPr lang="en-US" sz="2000" dirty="0" smtClean="0"/>
+              <a:t>  </a:t>
+            </a:r>
+            <a:r>
+              <a:rPr lang="en-US" sz="2000" dirty="0" smtClean="0">
+                <a:solidFill>
+                  <a:srgbClr val="008000"/>
+                </a:solidFill>
+              </a:rPr>
+              <a:t>EMBL </a:t>
+            </a:r>
+            <a:r>
+              <a:rPr lang="en-US" sz="2000" dirty="0">
+                <a:solidFill>
+                  <a:srgbClr val="008000"/>
+                </a:solidFill>
+              </a:rPr>
+              <a:t>IT </a:t>
+            </a:r>
+            <a:r>
+              <a:rPr lang="en-US" sz="2000" dirty="0" smtClean="0">
+                <a:solidFill>
+                  <a:srgbClr val="008000"/>
+                </a:solidFill>
+              </a:rPr>
+              <a:t>Services</a:t>
+            </a:r>
+            <a:endParaRPr lang="en-US" sz="2000" dirty="0">
+              <a:solidFill>
+                <a:srgbClr val="008000"/>
+              </a:solidFill>
+            </a:endParaRPr>
+          </a:p>
+        </p:txBody>
+      </p:sp>
+    </p:spTree>
+    <p:extLst>
+      <p:ext uri="{BB962C8B-B14F-4D97-AF65-F5344CB8AC3E}">
+        <p14:creationId xmlns:p14="http://schemas.microsoft.com/office/powerpoint/2010/main" val="3309285469"/>
+      </p:ext>
+    </p:extLst>
+  </p:cSld>
+  <p:clrMapOvr>
+    <a:masterClrMapping/>
+  </p:clrMapOvr>
+</p:sld>
+</file>
+
+<file path=ppt/slides/slide2.xml><?xml version="1.0" encoding="utf-8"?>
+<p:sld xmlns:a="http://schemas.openxmlformats.org/drawingml/2006/main" xmlns:r="http://schemas.openxmlformats.org/officeDocument/2006/relationships" xmlns:p="http://schemas.openxmlformats.org/presentationml/2006/main">
+  <p:cSld>
+    <p:spTree>
+      <p:nvGrpSpPr>
+        <p:cNvPr id="1" name=""/>
+        <p:cNvGrpSpPr/>
+        <p:nvPr/>
+      </p:nvGrpSpPr>
+      <p:grpSpPr>
+        <a:xfrm>
+          <a:off x="0" y="0"/>
+          <a:ext cx="0" cy="0"/>
+          <a:chOff x="0" y="0"/>
+          <a:chExt cx="0" cy="0"/>
+        </a:xfrm>
+      </p:grpSpPr>
+      <p:sp>
+        <p:nvSpPr>
+          <p:cNvPr id="2" name="Title 1"/>
+          <p:cNvSpPr>
+            <a:spLocks noGrp="1"/>
+          </p:cNvSpPr>
+          <p:nvPr>
+            <p:ph type="ctrTitle"/>
+          </p:nvPr>
+        </p:nvSpPr>
+        <p:spPr/>
+        <p:txBody>
+          <a:bodyPr/>
+          <a:lstStyle/>
+          <a:p>
+            <a:r>
+              <a:rPr lang="en-US" dirty="0"/>
+              <a:t>Version Control with </a:t>
+            </a:r>
+            <a:r>
+              <a:rPr lang="en-US" dirty="0" err="1" smtClean="0"/>
+              <a:t>GitLab</a:t>
+            </a:r>
+            <a:r>
+              <a:rPr lang="en-US" dirty="0" smtClean="0"/>
+              <a:t/>
+            </a:r>
+            <a:br>
+              <a:rPr lang="en-US" dirty="0" smtClean="0"/>
+            </a:br>
+            <a:r>
+              <a:rPr lang="en-US" dirty="0" smtClean="0"/>
+              <a:t>at </a:t>
+            </a:r>
+            <a:r>
+              <a:rPr lang="en-US" dirty="0"/>
+              <a:t>EMBL</a:t>
+            </a:r>
+            <a:endParaRPr lang="en-US" dirty="0"/>
+          </a:p>
+        </p:txBody>
+      </p:sp>
+      <p:sp>
+        <p:nvSpPr>
+          <p:cNvPr id="3" name="Subtitle 2"/>
+          <p:cNvSpPr>
+            <a:spLocks noGrp="1"/>
+          </p:cNvSpPr>
+          <p:nvPr>
+            <p:ph type="subTitle" idx="1"/>
+          </p:nvPr>
+        </p:nvSpPr>
+        <p:spPr/>
+        <p:txBody>
+          <a:bodyPr/>
+          <a:lstStyle/>
+          <a:p>
+            <a:r>
+              <a:rPr lang="en-US" dirty="0" err="1" smtClean="0"/>
+              <a:t>Holger</a:t>
+            </a:r>
+            <a:r>
+              <a:rPr lang="en-US" dirty="0" smtClean="0"/>
+              <a:t> </a:t>
+            </a:r>
+            <a:r>
+              <a:rPr lang="en-US" dirty="0" err="1" smtClean="0"/>
+              <a:t>Dinkel</a:t>
+            </a:r>
+            <a:r>
+              <a:rPr lang="en-US" dirty="0" smtClean="0"/>
+              <a:t> und Grischa </a:t>
+            </a:r>
+            <a:r>
+              <a:rPr lang="en-US" dirty="0" err="1" smtClean="0"/>
+              <a:t>T</a:t>
+            </a:r>
+            <a:r>
+              <a:rPr lang="en-US" dirty="0" err="1" smtClean="0"/>
+              <a:t>ödt</a:t>
+            </a:r>
+            <a:endParaRPr lang="en-US" dirty="0"/>
+          </a:p>
+        </p:txBody>
+      </p:sp>
     </p:spTree>
     <p:extLst>
       <p:ext uri="{BB962C8B-B14F-4D97-AF65-F5344CB8AC3E}">
@@ -3800,7 +4234,7 @@
 </p:sld>
 </file>
 
-<file path=ppt/slides/slide2.xml><?xml version="1.0" encoding="utf-8"?>
+<file path=ppt/slides/slide3.xml><?xml version="1.0" encoding="utf-8"?>
 <p:sld xmlns:a="http://schemas.openxmlformats.org/drawingml/2006/main" xmlns:r="http://schemas.openxmlformats.org/officeDocument/2006/relationships" xmlns:p="http://schemas.openxmlformats.org/presentationml/2006/main">
   <p:cSld>
     <p:spTree>
@@ -3979,7 +4413,7 @@
 </p:sld>
 </file>
 
-<file path=ppt/slides/slide3.xml><?xml version="1.0" encoding="utf-8"?>
+<file path=ppt/slides/slide4.xml><?xml version="1.0" encoding="utf-8"?>
 <p:sld xmlns:a="http://schemas.openxmlformats.org/drawingml/2006/main" xmlns:r="http://schemas.openxmlformats.org/officeDocument/2006/relationships" xmlns:p="http://schemas.openxmlformats.org/presentationml/2006/main">
   <p:cSld>
     <p:spTree>
@@ -4236,7 +4670,498 @@
 </p:sld>
 </file>
 
-<file path=ppt/slides/slide4.xml><?xml version="1.0" encoding="utf-8"?>
+<file path=ppt/slides/slide5.xml><?xml version="1.0" encoding="utf-8"?>
+<p:sld xmlns:a="http://schemas.openxmlformats.org/drawingml/2006/main" xmlns:r="http://schemas.openxmlformats.org/officeDocument/2006/relationships" xmlns:p="http://schemas.openxmlformats.org/presentationml/2006/main">
+  <p:cSld>
+    <p:spTree>
+      <p:nvGrpSpPr>
+        <p:cNvPr id="1" name=""/>
+        <p:cNvGrpSpPr/>
+        <p:nvPr/>
+      </p:nvGrpSpPr>
+      <p:grpSpPr>
+        <a:xfrm>
+          <a:off x="0" y="0"/>
+          <a:ext cx="0" cy="0"/>
+          <a:chOff x="0" y="0"/>
+          <a:chExt cx="0" cy="0"/>
+        </a:xfrm>
+      </p:grpSpPr>
+      <p:pic>
+        <p:nvPicPr>
+          <p:cNvPr id="5" name="Picture 4"/>
+          <p:cNvPicPr>
+            <a:picLocks noChangeAspect="1"/>
+          </p:cNvPicPr>
+          <p:nvPr/>
+        </p:nvPicPr>
+        <p:blipFill>
+          <a:blip r:embed="rId2"/>
+          <a:stretch>
+            <a:fillRect/>
+          </a:stretch>
+        </p:blipFill>
+        <p:spPr>
+          <a:xfrm>
+            <a:off x="5216717" y="5216503"/>
+            <a:ext cx="1230609" cy="1369400"/>
+          </a:xfrm>
+          <a:prstGeom prst="rect">
+            <a:avLst/>
+          </a:prstGeom>
+        </p:spPr>
+      </p:pic>
+      <p:pic>
+        <p:nvPicPr>
+          <p:cNvPr id="6" name="Picture 5"/>
+          <p:cNvPicPr>
+            <a:picLocks noChangeAspect="1"/>
+          </p:cNvPicPr>
+          <p:nvPr/>
+        </p:nvPicPr>
+        <p:blipFill>
+          <a:blip r:embed="rId3"/>
+          <a:stretch>
+            <a:fillRect/>
+          </a:stretch>
+        </p:blipFill>
+        <p:spPr>
+          <a:xfrm>
+            <a:off x="5312050" y="3262424"/>
+            <a:ext cx="2892747" cy="1028399"/>
+          </a:xfrm>
+          <a:prstGeom prst="rect">
+            <a:avLst/>
+          </a:prstGeom>
+        </p:spPr>
+      </p:pic>
+      <p:pic>
+        <p:nvPicPr>
+          <p:cNvPr id="7" name="Picture 6"/>
+          <p:cNvPicPr>
+            <a:picLocks noChangeAspect="1"/>
+          </p:cNvPicPr>
+          <p:nvPr/>
+        </p:nvPicPr>
+        <p:blipFill>
+          <a:blip r:embed="rId4"/>
+          <a:stretch>
+            <a:fillRect/>
+          </a:stretch>
+        </p:blipFill>
+        <p:spPr>
+          <a:xfrm>
+            <a:off x="306072" y="1390930"/>
+            <a:ext cx="2794000" cy="1168400"/>
+          </a:xfrm>
+          <a:prstGeom prst="rect">
+            <a:avLst/>
+          </a:prstGeom>
+        </p:spPr>
+      </p:pic>
+      <p:sp>
+        <p:nvSpPr>
+          <p:cNvPr id="9" name="TextBox 8"/>
+          <p:cNvSpPr txBox="1"/>
+          <p:nvPr/>
+        </p:nvSpPr>
+        <p:spPr>
+          <a:xfrm>
+            <a:off x="6758424" y="5556708"/>
+            <a:ext cx="2129710" cy="584776"/>
+          </a:xfrm>
+          <a:prstGeom prst="rect">
+            <a:avLst/>
+          </a:prstGeom>
+          <a:noFill/>
+        </p:spPr>
+        <p:txBody>
+          <a:bodyPr wrap="none" rtlCol="0">
+            <a:spAutoFit/>
+          </a:bodyPr>
+          <a:lstStyle/>
+          <a:p>
+            <a:r>
+              <a:rPr lang="en-US" sz="3200" b="1" dirty="0" err="1" smtClean="0"/>
+              <a:t>git.embl.de</a:t>
+            </a:r>
+            <a:endParaRPr lang="en-US" sz="3200" b="1" dirty="0"/>
+          </a:p>
+        </p:txBody>
+      </p:sp>
+      <p:sp>
+        <p:nvSpPr>
+          <p:cNvPr id="10" name="TextBox 9"/>
+          <p:cNvSpPr txBox="1"/>
+          <p:nvPr/>
+        </p:nvSpPr>
+        <p:spPr>
+          <a:xfrm>
+            <a:off x="306072" y="118297"/>
+            <a:ext cx="1681357" cy="369332"/>
+          </a:xfrm>
+          <a:prstGeom prst="rect">
+            <a:avLst/>
+          </a:prstGeom>
+          <a:noFill/>
+        </p:spPr>
+        <p:txBody>
+          <a:bodyPr wrap="none" rtlCol="0">
+            <a:spAutoFit/>
+          </a:bodyPr>
+          <a:lstStyle/>
+          <a:p>
+            <a:r>
+              <a:rPr lang="en-US" b="1" dirty="0" smtClean="0"/>
+              <a:t>Version Control</a:t>
+            </a:r>
+            <a:endParaRPr lang="en-US" b="1" dirty="0"/>
+          </a:p>
+        </p:txBody>
+      </p:sp>
+      <p:sp>
+        <p:nvSpPr>
+          <p:cNvPr id="11" name="TextBox 10"/>
+          <p:cNvSpPr txBox="1"/>
+          <p:nvPr/>
+        </p:nvSpPr>
+        <p:spPr>
+          <a:xfrm>
+            <a:off x="6272794" y="163657"/>
+            <a:ext cx="2817824" cy="584776"/>
+          </a:xfrm>
+          <a:prstGeom prst="rect">
+            <a:avLst/>
+          </a:prstGeom>
+          <a:noFill/>
+        </p:spPr>
+        <p:txBody>
+          <a:bodyPr wrap="none" rtlCol="0">
+            <a:spAutoFit/>
+          </a:bodyPr>
+          <a:lstStyle/>
+          <a:p>
+            <a:pPr algn="r"/>
+            <a:r>
+              <a:rPr lang="en-US" b="1" dirty="0" smtClean="0"/>
+              <a:t>Version Control on Steroids</a:t>
+            </a:r>
+          </a:p>
+          <a:p>
+            <a:pPr algn="r"/>
+            <a:r>
+              <a:rPr lang="en-US" sz="1400" dirty="0" smtClean="0"/>
+              <a:t>[Frank Thommen]</a:t>
+            </a:r>
+            <a:endParaRPr lang="en-US" sz="1400" dirty="0"/>
+          </a:p>
+        </p:txBody>
+      </p:sp>
+      <p:grpSp>
+        <p:nvGrpSpPr>
+          <p:cNvPr id="15" name="Group 14"/>
+          <p:cNvGrpSpPr/>
+          <p:nvPr/>
+        </p:nvGrpSpPr>
+        <p:grpSpPr>
+          <a:xfrm>
+            <a:off x="5103679" y="1390930"/>
+            <a:ext cx="3309489" cy="1255929"/>
+            <a:chOff x="4936434" y="1749564"/>
+            <a:chExt cx="3309489" cy="1255929"/>
+          </a:xfrm>
+        </p:grpSpPr>
+        <p:pic>
+          <p:nvPicPr>
+            <p:cNvPr id="8" name="Picture 7"/>
+            <p:cNvPicPr>
+              <a:picLocks noChangeAspect="1"/>
+            </p:cNvPicPr>
+            <p:nvPr/>
+          </p:nvPicPr>
+          <p:blipFill>
+            <a:blip r:embed="rId5"/>
+            <a:stretch>
+              <a:fillRect/>
+            </a:stretch>
+          </p:blipFill>
+          <p:spPr>
+            <a:xfrm>
+              <a:off x="4936434" y="1749564"/>
+              <a:ext cx="1510892" cy="1255929"/>
+            </a:xfrm>
+            <a:prstGeom prst="rect">
+              <a:avLst/>
+            </a:prstGeom>
+          </p:spPr>
+        </p:pic>
+        <p:pic>
+          <p:nvPicPr>
+            <p:cNvPr id="12" name="Picture 11"/>
+            <p:cNvPicPr>
+              <a:picLocks noChangeAspect="1"/>
+            </p:cNvPicPr>
+            <p:nvPr/>
+          </p:nvPicPr>
+          <p:blipFill>
+            <a:blip r:embed="rId6"/>
+            <a:stretch>
+              <a:fillRect/>
+            </a:stretch>
+          </p:blipFill>
+          <p:spPr>
+            <a:xfrm>
+              <a:off x="6328323" y="1749564"/>
+              <a:ext cx="1917600" cy="639200"/>
+            </a:xfrm>
+            <a:prstGeom prst="rect">
+              <a:avLst/>
+            </a:prstGeom>
+          </p:spPr>
+        </p:pic>
+      </p:grpSp>
+      <p:cxnSp>
+        <p:nvCxnSpPr>
+          <p:cNvPr id="14" name="Straight Connector 13"/>
+          <p:cNvCxnSpPr/>
+          <p:nvPr/>
+        </p:nvCxnSpPr>
+        <p:spPr>
+          <a:xfrm>
+            <a:off x="4626572" y="0"/>
+            <a:ext cx="0" cy="6858000"/>
+          </a:xfrm>
+          <a:prstGeom prst="line">
+            <a:avLst/>
+          </a:prstGeom>
+          <a:ln>
+            <a:solidFill>
+              <a:schemeClr val="bg1">
+                <a:lumMod val="50000"/>
+              </a:schemeClr>
+            </a:solidFill>
+            <a:prstDash val="sysDash"/>
+          </a:ln>
+        </p:spPr>
+        <p:style>
+          <a:lnRef idx="2">
+            <a:schemeClr val="accent1"/>
+          </a:lnRef>
+          <a:fillRef idx="0">
+            <a:schemeClr val="accent1"/>
+          </a:fillRef>
+          <a:effectRef idx="1">
+            <a:schemeClr val="accent1"/>
+          </a:effectRef>
+          <a:fontRef idx="minor">
+            <a:schemeClr val="tx1"/>
+          </a:fontRef>
+        </p:style>
+      </p:cxnSp>
+      <p:cxnSp>
+        <p:nvCxnSpPr>
+          <p:cNvPr id="16" name="Straight Connector 15"/>
+          <p:cNvCxnSpPr/>
+          <p:nvPr/>
+        </p:nvCxnSpPr>
+        <p:spPr>
+          <a:xfrm flipH="1">
+            <a:off x="4626572" y="4989698"/>
+            <a:ext cx="4517428" cy="0"/>
+          </a:xfrm>
+          <a:prstGeom prst="line">
+            <a:avLst/>
+          </a:prstGeom>
+          <a:ln>
+            <a:solidFill>
+              <a:schemeClr val="bg1">
+                <a:lumMod val="50000"/>
+              </a:schemeClr>
+            </a:solidFill>
+            <a:prstDash val="sysDash"/>
+          </a:ln>
+        </p:spPr>
+        <p:style>
+          <a:lnRef idx="2">
+            <a:schemeClr val="accent1"/>
+          </a:lnRef>
+          <a:fillRef idx="0">
+            <a:schemeClr val="accent1"/>
+          </a:fillRef>
+          <a:effectRef idx="1">
+            <a:schemeClr val="accent1"/>
+          </a:effectRef>
+          <a:fontRef idx="minor">
+            <a:schemeClr val="tx1"/>
+          </a:fontRef>
+        </p:style>
+      </p:cxnSp>
+      <p:sp>
+        <p:nvSpPr>
+          <p:cNvPr id="20" name="TextBox 19"/>
+          <p:cNvSpPr txBox="1"/>
+          <p:nvPr/>
+        </p:nvSpPr>
+        <p:spPr>
+          <a:xfrm>
+            <a:off x="6837002" y="1966473"/>
+            <a:ext cx="1250575" cy="646331"/>
+          </a:xfrm>
+          <a:prstGeom prst="rect">
+            <a:avLst/>
+          </a:prstGeom>
+          <a:noFill/>
+        </p:spPr>
+        <p:txBody>
+          <a:bodyPr wrap="none" rtlCol="0">
+            <a:spAutoFit/>
+          </a:bodyPr>
+          <a:lstStyle/>
+          <a:p>
+            <a:r>
+              <a:rPr lang="en-US" dirty="0" smtClean="0"/>
+              <a:t>2.4k $/year</a:t>
+            </a:r>
+            <a:br>
+              <a:rPr lang="en-US" dirty="0" smtClean="0"/>
+            </a:br>
+            <a:r>
+              <a:rPr lang="en-US" dirty="0" smtClean="0"/>
+              <a:t>125 repos</a:t>
+            </a:r>
+            <a:endParaRPr lang="en-US" dirty="0"/>
+          </a:p>
+        </p:txBody>
+      </p:sp>
+      <p:sp>
+        <p:nvSpPr>
+          <p:cNvPr id="21" name="TextBox 20"/>
+          <p:cNvSpPr txBox="1"/>
+          <p:nvPr/>
+        </p:nvSpPr>
+        <p:spPr>
+          <a:xfrm>
+            <a:off x="6837002" y="4150873"/>
+            <a:ext cx="1250575" cy="646331"/>
+          </a:xfrm>
+          <a:prstGeom prst="rect">
+            <a:avLst/>
+          </a:prstGeom>
+          <a:noFill/>
+        </p:spPr>
+        <p:txBody>
+          <a:bodyPr wrap="none" rtlCol="0">
+            <a:spAutoFit/>
+          </a:bodyPr>
+          <a:lstStyle/>
+          <a:p>
+            <a:r>
+              <a:rPr lang="en-US" dirty="0" smtClean="0"/>
+              <a:t>4.9k $/year</a:t>
+            </a:r>
+            <a:br>
+              <a:rPr lang="en-US" dirty="0" smtClean="0"/>
+            </a:br>
+            <a:r>
+              <a:rPr lang="en-US" dirty="0" smtClean="0"/>
+              <a:t>100 users</a:t>
+            </a:r>
+            <a:endParaRPr lang="en-US" dirty="0"/>
+          </a:p>
+        </p:txBody>
+      </p:sp>
+      <p:sp>
+        <p:nvSpPr>
+          <p:cNvPr id="22" name="TextBox 21"/>
+          <p:cNvSpPr txBox="1"/>
+          <p:nvPr/>
+        </p:nvSpPr>
+        <p:spPr>
+          <a:xfrm>
+            <a:off x="6758424" y="6208581"/>
+            <a:ext cx="1370951" cy="646331"/>
+          </a:xfrm>
+          <a:prstGeom prst="rect">
+            <a:avLst/>
+          </a:prstGeom>
+          <a:noFill/>
+        </p:spPr>
+        <p:txBody>
+          <a:bodyPr wrap="none" rtlCol="0">
+            <a:spAutoFit/>
+          </a:bodyPr>
+          <a:lstStyle/>
+          <a:p>
+            <a:r>
+              <a:rPr lang="en-US" dirty="0"/>
+              <a:t>open </a:t>
+            </a:r>
+            <a:r>
+              <a:rPr lang="en-US" dirty="0" smtClean="0"/>
+              <a:t>source</a:t>
+            </a:r>
+            <a:br>
+              <a:rPr lang="en-US" dirty="0" smtClean="0"/>
+            </a:br>
+            <a:r>
+              <a:rPr lang="en-US" dirty="0" smtClean="0"/>
+              <a:t>MIT licensed</a:t>
+            </a:r>
+            <a:endParaRPr lang="en-US" dirty="0"/>
+          </a:p>
+        </p:txBody>
+      </p:sp>
+      <p:sp>
+        <p:nvSpPr>
+          <p:cNvPr id="23" name="Rectangle 22"/>
+          <p:cNvSpPr/>
+          <p:nvPr/>
+        </p:nvSpPr>
+        <p:spPr>
+          <a:xfrm>
+            <a:off x="4830136" y="864755"/>
+            <a:ext cx="3583032" cy="369332"/>
+          </a:xfrm>
+          <a:prstGeom prst="rect">
+            <a:avLst/>
+          </a:prstGeom>
+        </p:spPr>
+        <p:txBody>
+          <a:bodyPr wrap="none">
+            <a:spAutoFit/>
+          </a:bodyPr>
+          <a:lstStyle/>
+          <a:p>
+            <a:r>
+              <a:rPr lang="en-US" dirty="0" err="1"/>
+              <a:t>Git</a:t>
+            </a:r>
+            <a:r>
+              <a:rPr lang="en-US" dirty="0"/>
+              <a:t> repository </a:t>
+            </a:r>
+            <a:r>
+              <a:rPr lang="en-US" dirty="0" smtClean="0"/>
+              <a:t>management systems</a:t>
+            </a:r>
+            <a:endParaRPr lang="en-US" dirty="0"/>
+          </a:p>
+        </p:txBody>
+      </p:sp>
+    </p:spTree>
+    <p:extLst>
+      <p:ext uri="{BB962C8B-B14F-4D97-AF65-F5344CB8AC3E}">
+        <p14:creationId xmlns:p14="http://schemas.microsoft.com/office/powerpoint/2010/main" val="4265571729"/>
+      </p:ext>
+    </p:extLst>
+  </p:cSld>
+  <p:clrMapOvr>
+    <a:masterClrMapping/>
+  </p:clrMapOvr>
+</p:sld>
+</file>
+
+<file path=ppt/slides/slide6.xml><?xml version="1.0" encoding="utf-8"?>
 <p:sld xmlns:a="http://schemas.openxmlformats.org/drawingml/2006/main" xmlns:r="http://schemas.openxmlformats.org/officeDocument/2006/relationships" xmlns:p="http://schemas.openxmlformats.org/presentationml/2006/main">
   <p:cSld>
     <p:spTree>
@@ -4794,7 +5719,7 @@
 </p:sld>
 </file>
 
-<file path=ppt/slides/slide5.xml><?xml version="1.0" encoding="utf-8"?>
+<file path=ppt/slides/slide7.xml><?xml version="1.0" encoding="utf-8"?>
 <p:sld xmlns:a="http://schemas.openxmlformats.org/drawingml/2006/main" xmlns:r="http://schemas.openxmlformats.org/officeDocument/2006/relationships" xmlns:p="http://schemas.openxmlformats.org/presentationml/2006/main">
   <p:cSld>
     <p:spTree>
@@ -4813,25 +5738,6 @@
       </p:grpSpPr>
       <p:sp>
         <p:nvSpPr>
-          <p:cNvPr id="2" name="Title 1"/>
-          <p:cNvSpPr>
-            <a:spLocks noGrp="1"/>
-          </p:cNvSpPr>
-          <p:nvPr>
-            <p:ph type="title"/>
-          </p:nvPr>
-        </p:nvSpPr>
-        <p:spPr/>
-        <p:txBody>
-          <a:bodyPr/>
-          <a:lstStyle/>
-          <a:p>
-            <a:endParaRPr lang="en-US"/>
-          </a:p>
-        </p:txBody>
-      </p:sp>
-      <p:sp>
-        <p:nvSpPr>
           <p:cNvPr id="3" name="Content Placeholder 2"/>
           <p:cNvSpPr>
             <a:spLocks noGrp="1"/>
@@ -4840,72 +5746,362 @@
             <p:ph idx="1"/>
           </p:nvPr>
         </p:nvSpPr>
-        <p:spPr/>
-        <p:txBody>
-          <a:bodyPr/>
+        <p:spPr>
+          <a:xfrm>
+            <a:off x="457200" y="387684"/>
+            <a:ext cx="8229600" cy="5738479"/>
+          </a:xfrm>
+        </p:spPr>
+        <p:txBody>
+          <a:bodyPr>
+            <a:normAutofit fontScale="85000" lnSpcReduction="20000"/>
+          </a:bodyPr>
           <a:lstStyle/>
           <a:p>
             <a:r>
               <a:rPr lang="en-US" dirty="0" smtClean="0"/>
-              <a:t>LDAP / </a:t>
-            </a:r>
+              <a:t>EMBL hosted</a:t>
+            </a:r>
+          </a:p>
+          <a:p>
+            <a:pPr marL="0" indent="0">
+              <a:buNone/>
+            </a:pPr>
+            <a:r>
+              <a:rPr lang="en-US" dirty="0" smtClean="0"/>
+              <a:t>	</a:t>
+            </a:r>
+            <a:r>
+              <a:rPr lang="en-US" sz="2300" dirty="0" smtClean="0"/>
+              <a:t>(data privacy issues avoided)</a:t>
+            </a:r>
+            <a:endParaRPr lang="en-US" sz="2300" dirty="0" smtClean="0"/>
+          </a:p>
+          <a:p>
+            <a:pPr marL="0" indent="0">
+              <a:buNone/>
+            </a:pPr>
+            <a:endParaRPr lang="en-US" dirty="0" smtClean="0"/>
+          </a:p>
+          <a:p>
+            <a:endParaRPr lang="en-US" dirty="0" smtClean="0"/>
+          </a:p>
+          <a:p>
+            <a:endParaRPr lang="en-US" dirty="0" smtClean="0"/>
+          </a:p>
+          <a:p>
+            <a:endParaRPr lang="en-US" dirty="0" smtClean="0"/>
+          </a:p>
+          <a:p>
+            <a:r>
+              <a:rPr lang="en-US" dirty="0" smtClean="0"/>
+              <a:t>Access Controlled</a:t>
+            </a:r>
+          </a:p>
+          <a:p>
+            <a:endParaRPr lang="en-US" dirty="0"/>
+          </a:p>
+          <a:p>
+            <a:endParaRPr lang="en-US" dirty="0" smtClean="0"/>
+          </a:p>
+          <a:p>
+            <a:endParaRPr lang="en-US" dirty="0" smtClean="0"/>
+          </a:p>
+          <a:p>
+            <a:r>
+              <a:rPr lang="en-US" dirty="0" smtClean="0"/>
+              <a:t>repository </a:t>
+            </a:r>
+            <a:r>
+              <a:rPr lang="en-US" dirty="0"/>
+              <a:t>management, code reviews, issue tracking, activity feeds and </a:t>
+            </a:r>
+            <a:r>
+              <a:rPr lang="en-US" dirty="0" smtClean="0"/>
+              <a:t>wikis</a:t>
+            </a:r>
+            <a:r>
+              <a:rPr lang="is-IS" dirty="0" smtClean="0"/>
+              <a:t>….</a:t>
+            </a:r>
+          </a:p>
+          <a:p>
+            <a:endParaRPr lang="is-IS" dirty="0"/>
+          </a:p>
+          <a:p>
+            <a:pPr marL="3200400" lvl="7" indent="0">
+              <a:buNone/>
+            </a:pPr>
+            <a:r>
+              <a:rPr lang="is-IS" sz="2800" dirty="0" smtClean="0">
+                <a:sym typeface="Wingdings"/>
+              </a:rPr>
+              <a:t> lets have a look</a:t>
+            </a:r>
+            <a:endParaRPr lang="de-DE" sz="2800" dirty="0">
+              <a:hlinkClick r:id="rId2"/>
+            </a:endParaRPr>
+          </a:p>
+          <a:p>
+            <a:endParaRPr lang="en-US" dirty="0" smtClean="0"/>
+          </a:p>
+        </p:txBody>
+      </p:sp>
+      <p:pic>
+        <p:nvPicPr>
+          <p:cNvPr id="4" name="Picture 3"/>
+          <p:cNvPicPr>
+            <a:picLocks noChangeAspect="1"/>
+          </p:cNvPicPr>
+          <p:nvPr/>
+        </p:nvPicPr>
+        <p:blipFill>
+          <a:blip r:embed="rId3"/>
+          <a:stretch>
+            <a:fillRect/>
+          </a:stretch>
+        </p:blipFill>
+        <p:spPr>
+          <a:xfrm>
+            <a:off x="6892780" y="3192377"/>
+            <a:ext cx="593557" cy="593557"/>
+          </a:xfrm>
+          <a:prstGeom prst="rect">
+            <a:avLst/>
+          </a:prstGeom>
+        </p:spPr>
+      </p:pic>
+      <p:pic>
+        <p:nvPicPr>
+          <p:cNvPr id="6" name="Picture 5"/>
+          <p:cNvPicPr>
+            <a:picLocks noChangeAspect="1"/>
+          </p:cNvPicPr>
+          <p:nvPr/>
+        </p:nvPicPr>
+        <p:blipFill>
+          <a:blip r:embed="rId4"/>
+          <a:stretch>
+            <a:fillRect/>
+          </a:stretch>
+        </p:blipFill>
+        <p:spPr>
+          <a:xfrm>
+            <a:off x="4323836" y="3192377"/>
+            <a:ext cx="1796209" cy="593557"/>
+          </a:xfrm>
+          <a:prstGeom prst="rect">
+            <a:avLst/>
+          </a:prstGeom>
+        </p:spPr>
+      </p:pic>
+      <p:pic>
+        <p:nvPicPr>
+          <p:cNvPr id="7" name="Picture 6"/>
+          <p:cNvPicPr>
+            <a:picLocks noChangeAspect="1"/>
+          </p:cNvPicPr>
+          <p:nvPr/>
+        </p:nvPicPr>
+        <p:blipFill>
+          <a:blip r:embed="rId5"/>
+          <a:stretch>
+            <a:fillRect/>
+          </a:stretch>
+        </p:blipFill>
+        <p:spPr>
+          <a:xfrm>
+            <a:off x="4571510" y="418717"/>
+            <a:ext cx="2298388" cy="958230"/>
+          </a:xfrm>
+          <a:prstGeom prst="rect">
+            <a:avLst/>
+          </a:prstGeom>
+        </p:spPr>
+      </p:pic>
+      <p:grpSp>
+        <p:nvGrpSpPr>
+          <p:cNvPr id="10" name="Group 9"/>
+          <p:cNvGrpSpPr/>
+          <p:nvPr/>
+        </p:nvGrpSpPr>
+        <p:grpSpPr>
+          <a:xfrm>
+            <a:off x="6998193" y="261485"/>
+            <a:ext cx="1309700" cy="1436304"/>
+            <a:chOff x="2667000" y="1333500"/>
+            <a:chExt cx="3810000" cy="4178300"/>
+          </a:xfrm>
+        </p:grpSpPr>
+        <p:pic>
+          <p:nvPicPr>
+            <p:cNvPr id="8" name="Picture 7"/>
+            <p:cNvPicPr>
+              <a:picLocks noChangeAspect="1"/>
+            </p:cNvPicPr>
+            <p:nvPr/>
+          </p:nvPicPr>
+          <p:blipFill>
+            <a:blip r:embed="rId6"/>
+            <a:stretch>
+              <a:fillRect/>
+            </a:stretch>
+          </p:blipFill>
+          <p:spPr>
+            <a:xfrm>
+              <a:off x="2667000" y="1333500"/>
+              <a:ext cx="3810000" cy="4178300"/>
+            </a:xfrm>
+            <a:prstGeom prst="rect">
+              <a:avLst/>
+            </a:prstGeom>
+          </p:spPr>
+        </p:pic>
+        <p:pic>
+          <p:nvPicPr>
+            <p:cNvPr id="9" name="Picture 8"/>
+            <p:cNvPicPr>
+              <a:picLocks noChangeAspect="1"/>
+            </p:cNvPicPr>
+            <p:nvPr/>
+          </p:nvPicPr>
+          <p:blipFill>
+            <a:blip r:embed="rId7"/>
+            <a:stretch>
+              <a:fillRect/>
+            </a:stretch>
+          </p:blipFill>
+          <p:spPr>
+            <a:xfrm>
+              <a:off x="3646676" y="2820737"/>
+              <a:ext cx="907557" cy="390852"/>
+            </a:xfrm>
+            <a:prstGeom prst="rect">
+              <a:avLst/>
+            </a:prstGeom>
+          </p:spPr>
+        </p:pic>
+      </p:grpSp>
+      <p:sp>
+        <p:nvSpPr>
+          <p:cNvPr id="14" name="TextBox 13"/>
+          <p:cNvSpPr txBox="1"/>
+          <p:nvPr/>
+        </p:nvSpPr>
+        <p:spPr>
+          <a:xfrm>
+            <a:off x="5079311" y="3809632"/>
+            <a:ext cx="428322" cy="369332"/>
+          </a:xfrm>
+          <a:prstGeom prst="rect">
+            <a:avLst/>
+          </a:prstGeom>
+          <a:noFill/>
+        </p:spPr>
+        <p:txBody>
+          <a:bodyPr wrap="none" rtlCol="0">
+            <a:spAutoFit/>
+          </a:bodyPr>
+          <a:lstStyle/>
+          <a:p>
             <a:r>
               <a:rPr lang="en-US" dirty="0" err="1" smtClean="0"/>
-              <a:t>ssh</a:t>
+              <a:t>git</a:t>
+            </a:r>
+            <a:endParaRPr lang="en-US" dirty="0"/>
+          </a:p>
+        </p:txBody>
+      </p:sp>
+      <p:sp>
+        <p:nvSpPr>
+          <p:cNvPr id="15" name="TextBox 14"/>
+          <p:cNvSpPr txBox="1"/>
+          <p:nvPr/>
+        </p:nvSpPr>
+        <p:spPr>
+          <a:xfrm>
+            <a:off x="6845987" y="3846699"/>
+            <a:ext cx="708435" cy="369332"/>
+          </a:xfrm>
+          <a:prstGeom prst="rect">
+            <a:avLst/>
+          </a:prstGeom>
+          <a:noFill/>
+        </p:spPr>
+        <p:txBody>
+          <a:bodyPr wrap="none" rtlCol="0">
+            <a:spAutoFit/>
+          </a:bodyPr>
+          <a:lstStyle/>
+          <a:p>
+            <a:r>
+              <a:rPr lang="en-US" dirty="0" err="1" smtClean="0"/>
+              <a:t>gitlab</a:t>
+            </a:r>
+            <a:endParaRPr lang="en-US" dirty="0"/>
+          </a:p>
+        </p:txBody>
+      </p:sp>
+      <p:pic>
+        <p:nvPicPr>
+          <p:cNvPr id="16" name="Picture 15" descr="3TtTwrU.jpg"/>
+          <p:cNvPicPr>
+            <a:picLocks noChangeAspect="1"/>
+          </p:cNvPicPr>
+          <p:nvPr/>
+        </p:nvPicPr>
+        <p:blipFill>
+          <a:blip r:embed="rId8">
+            <a:extLst>
+              <a:ext uri="{28A0092B-C50C-407E-A947-70E740481C1C}">
+                <a14:useLocalDpi xmlns:a14="http://schemas.microsoft.com/office/drawing/2010/main" val="0"/>
+              </a:ext>
+            </a:extLst>
+          </a:blip>
+          <a:stretch>
+            <a:fillRect/>
+          </a:stretch>
+        </p:blipFill>
+        <p:spPr>
+          <a:xfrm>
+            <a:off x="4571510" y="1513123"/>
+            <a:ext cx="1818595" cy="1343693"/>
+          </a:xfrm>
+          <a:prstGeom prst="rect">
+            <a:avLst/>
+          </a:prstGeom>
+        </p:spPr>
+      </p:pic>
+      <p:sp>
+        <p:nvSpPr>
+          <p:cNvPr id="17" name="TextBox 16"/>
+          <p:cNvSpPr txBox="1"/>
+          <p:nvPr/>
+        </p:nvSpPr>
+        <p:spPr>
+          <a:xfrm>
+            <a:off x="1064877" y="1502246"/>
+            <a:ext cx="2138401" cy="369332"/>
+          </a:xfrm>
+          <a:prstGeom prst="rect">
+            <a:avLst/>
+          </a:prstGeom>
+          <a:noFill/>
+        </p:spPr>
+        <p:txBody>
+          <a:bodyPr wrap="none" rtlCol="0">
+            <a:spAutoFit/>
+          </a:bodyPr>
+          <a:lstStyle/>
+          <a:p>
+            <a:r>
+              <a:rPr lang="en-US" b="1" dirty="0" smtClean="0"/>
+              <a:t>not</a:t>
             </a:r>
             <a:r>
               <a:rPr lang="en-US" dirty="0" smtClean="0"/>
-              <a:t> keys</a:t>
-            </a:r>
-          </a:p>
-          <a:p>
-            <a:r>
-              <a:rPr lang="en-US" dirty="0" smtClean="0"/>
-              <a:t>EMBL hosted! </a:t>
-            </a:r>
-            <a:r>
-              <a:rPr lang="en-US" smtClean="0"/>
-              <a:t>Private!</a:t>
-            </a:r>
-            <a:endParaRPr lang="en-US" dirty="0" smtClean="0"/>
-          </a:p>
-          <a:p>
-            <a:r>
-              <a:rPr lang="en-US" dirty="0" smtClean="0"/>
-              <a:t>Public/Private</a:t>
-            </a:r>
-          </a:p>
-          <a:p>
-            <a:r>
-              <a:rPr lang="en-US" dirty="0" smtClean="0"/>
-              <a:t>Rights</a:t>
-            </a:r>
-          </a:p>
-          <a:p>
-            <a:r>
-              <a:rPr lang="en-US" dirty="0" err="1" smtClean="0"/>
-              <a:t>anbindung</a:t>
-            </a:r>
-            <a:r>
-              <a:rPr lang="en-US" dirty="0" smtClean="0"/>
-              <a:t> an </a:t>
-            </a:r>
-            <a:r>
-              <a:rPr lang="en-US" dirty="0" err="1" smtClean="0"/>
-              <a:t>github</a:t>
-            </a:r>
-            <a:r>
-              <a:rPr lang="en-US" dirty="0" smtClean="0"/>
-              <a:t>?</a:t>
-            </a:r>
-          </a:p>
-          <a:p>
-            <a:r>
-              <a:rPr lang="en-US" dirty="0" smtClean="0"/>
-              <a:t>Example: project fork, edit, pull request</a:t>
-            </a:r>
-          </a:p>
-          <a:p>
+              <a:t> a backup system</a:t>
+            </a:r>
             <a:endParaRPr lang="en-US" dirty="0"/>
           </a:p>
         </p:txBody>
@@ -4914,6 +6110,196 @@
     <p:extLst>
       <p:ext uri="{BB962C8B-B14F-4D97-AF65-F5344CB8AC3E}">
         <p14:creationId xmlns:p14="http://schemas.microsoft.com/office/powerpoint/2010/main" val="3883617440"/>
+      </p:ext>
+    </p:extLst>
+  </p:cSld>
+  <p:clrMapOvr>
+    <a:masterClrMapping/>
+  </p:clrMapOvr>
+</p:sld>
+</file>
+
+<file path=ppt/slides/slide8.xml><?xml version="1.0" encoding="utf-8"?>
+<p:sld xmlns:a="http://schemas.openxmlformats.org/drawingml/2006/main" xmlns:r="http://schemas.openxmlformats.org/officeDocument/2006/relationships" xmlns:p="http://schemas.openxmlformats.org/presentationml/2006/main">
+  <p:cSld>
+    <p:spTree>
+      <p:nvGrpSpPr>
+        <p:cNvPr id="1" name=""/>
+        <p:cNvGrpSpPr/>
+        <p:nvPr/>
+      </p:nvGrpSpPr>
+      <p:grpSpPr>
+        <a:xfrm>
+          <a:off x="0" y="0"/>
+          <a:ext cx="0" cy="0"/>
+          <a:chOff x="0" y="0"/>
+          <a:chExt cx="0" cy="0"/>
+        </a:xfrm>
+      </p:grpSpPr>
+      <p:sp>
+        <p:nvSpPr>
+          <p:cNvPr id="2" name="Title 1"/>
+          <p:cNvSpPr>
+            <a:spLocks noGrp="1"/>
+          </p:cNvSpPr>
+          <p:nvPr>
+            <p:ph type="title"/>
+          </p:nvPr>
+        </p:nvSpPr>
+        <p:spPr/>
+        <p:txBody>
+          <a:bodyPr/>
+          <a:lstStyle/>
+          <a:p>
+            <a:r>
+              <a:rPr lang="en-US" dirty="0" smtClean="0"/>
+              <a:t>stats</a:t>
+            </a:r>
+            <a:endParaRPr lang="en-US" dirty="0"/>
+          </a:p>
+        </p:txBody>
+      </p:sp>
+      <p:sp>
+        <p:nvSpPr>
+          <p:cNvPr id="3" name="Content Placeholder 2"/>
+          <p:cNvSpPr>
+            <a:spLocks noGrp="1"/>
+          </p:cNvSpPr>
+          <p:nvPr>
+            <p:ph idx="1"/>
+          </p:nvPr>
+        </p:nvSpPr>
+        <p:spPr/>
+        <p:txBody>
+          <a:bodyPr/>
+          <a:lstStyle/>
+          <a:p>
+            <a:endParaRPr lang="en-US"/>
+          </a:p>
+        </p:txBody>
+      </p:sp>
+      <p:pic>
+        <p:nvPicPr>
+          <p:cNvPr id="4" name="Picture 3" descr="Screen Shot 2015-12-18 at 9.33.30 AM.png"/>
+          <p:cNvPicPr>
+            <a:picLocks noChangeAspect="1"/>
+          </p:cNvPicPr>
+          <p:nvPr/>
+        </p:nvPicPr>
+        <p:blipFill>
+          <a:blip r:embed="rId2">
+            <a:extLst>
+              <a:ext uri="{28A0092B-C50C-407E-A947-70E740481C1C}">
+                <a14:useLocalDpi xmlns:a14="http://schemas.microsoft.com/office/drawing/2010/main" val="0"/>
+              </a:ext>
+            </a:extLst>
+          </a:blip>
+          <a:stretch>
+            <a:fillRect/>
+          </a:stretch>
+        </p:blipFill>
+        <p:spPr>
+          <a:xfrm>
+            <a:off x="0" y="1143000"/>
+            <a:ext cx="9144000" cy="5715000"/>
+          </a:xfrm>
+          <a:prstGeom prst="rect">
+            <a:avLst/>
+          </a:prstGeom>
+        </p:spPr>
+      </p:pic>
+    </p:spTree>
+    <p:extLst>
+      <p:ext uri="{BB962C8B-B14F-4D97-AF65-F5344CB8AC3E}">
+        <p14:creationId xmlns:p14="http://schemas.microsoft.com/office/powerpoint/2010/main" val="3875320686"/>
+      </p:ext>
+    </p:extLst>
+  </p:cSld>
+  <p:clrMapOvr>
+    <a:masterClrMapping/>
+  </p:clrMapOvr>
+</p:sld>
+</file>
+
+<file path=ppt/slides/slide9.xml><?xml version="1.0" encoding="utf-8"?>
+<p:sld xmlns:a="http://schemas.openxmlformats.org/drawingml/2006/main" xmlns:r="http://schemas.openxmlformats.org/officeDocument/2006/relationships" xmlns:p="http://schemas.openxmlformats.org/presentationml/2006/main">
+  <p:cSld>
+    <p:spTree>
+      <p:nvGrpSpPr>
+        <p:cNvPr id="1" name=""/>
+        <p:cNvGrpSpPr/>
+        <p:nvPr/>
+      </p:nvGrpSpPr>
+      <p:grpSpPr>
+        <a:xfrm>
+          <a:off x="0" y="0"/>
+          <a:ext cx="0" cy="0"/>
+          <a:chOff x="0" y="0"/>
+          <a:chExt cx="0" cy="0"/>
+        </a:xfrm>
+      </p:grpSpPr>
+      <p:pic>
+        <p:nvPicPr>
+          <p:cNvPr id="4" name="Picture 3" descr="Screen Shot 2015-12-18 at 9.32.56 AM.png"/>
+          <p:cNvPicPr>
+            <a:picLocks noChangeAspect="1"/>
+          </p:cNvPicPr>
+          <p:nvPr/>
+        </p:nvPicPr>
+        <p:blipFill>
+          <a:blip r:embed="rId2">
+            <a:extLst>
+              <a:ext uri="{28A0092B-C50C-407E-A947-70E740481C1C}">
+                <a14:useLocalDpi xmlns:a14="http://schemas.microsoft.com/office/drawing/2010/main" val="0"/>
+              </a:ext>
+            </a:extLst>
+          </a:blip>
+          <a:stretch>
+            <a:fillRect/>
+          </a:stretch>
+        </p:blipFill>
+        <p:spPr>
+          <a:xfrm>
+            <a:off x="0" y="1143000"/>
+            <a:ext cx="9144000" cy="5715000"/>
+          </a:xfrm>
+          <a:prstGeom prst="rect">
+            <a:avLst/>
+          </a:prstGeom>
+        </p:spPr>
+      </p:pic>
+      <p:sp>
+        <p:nvSpPr>
+          <p:cNvPr id="6" name="Title 1"/>
+          <p:cNvSpPr>
+            <a:spLocks noGrp="1"/>
+          </p:cNvSpPr>
+          <p:nvPr>
+            <p:ph type="title"/>
+          </p:nvPr>
+        </p:nvSpPr>
+        <p:spPr>
+          <a:xfrm>
+            <a:off x="457200" y="274638"/>
+            <a:ext cx="8229600" cy="1143000"/>
+          </a:xfrm>
+        </p:spPr>
+        <p:txBody>
+          <a:bodyPr/>
+          <a:lstStyle/>
+          <a:p>
+            <a:r>
+              <a:rPr lang="en-US" dirty="0" smtClean="0"/>
+              <a:t>stats</a:t>
+            </a:r>
+            <a:endParaRPr lang="en-US" dirty="0"/>
+          </a:p>
+        </p:txBody>
+      </p:sp>
+    </p:spTree>
+    <p:extLst>
+      <p:ext uri="{BB962C8B-B14F-4D97-AF65-F5344CB8AC3E}">
+        <p14:creationId xmlns:p14="http://schemas.microsoft.com/office/powerpoint/2010/main" val="1279213941"/>
       </p:ext>
     </p:extLst>
   </p:cSld>

</xml_diff>

<commit_message>
dunno but seems to be the latest version of the talk :)
</commit_message>
<xml_diff>
--- a/gitlab_embl/gitlab_at_embl.pptx
+++ b/gitlab_embl/gitlab_at_embl.pptx
@@ -520,10 +520,10 @@
             </a:r>
           </a:p>
           <a:p>
-            <a:endParaRPr lang="en-US" smtClean="0"/>
-          </a:p>
-          <a:p>
-            <a:endParaRPr lang="en-US" smtClean="0"/>
+            <a:endParaRPr lang="en-US" dirty="0" smtClean="0"/>
+          </a:p>
+          <a:p>
+            <a:endParaRPr lang="en-US" dirty="0" smtClean="0"/>
           </a:p>
           <a:p>
             <a:r>
@@ -3949,6 +3949,13 @@
   <p:clrMapOvr>
     <a:masterClrMapping/>
   </p:clrMapOvr>
+  <p:timing>
+    <p:tnLst>
+      <p:par>
+        <p:cTn xmlns:p14="http://schemas.microsoft.com/office/powerpoint/2010/main" id="1" dur="indefinite" restart="never" nodeType="tmRoot"/>
+      </p:par>
+    </p:tnLst>
+  </p:timing>
 </p:sld>
 </file>
 
@@ -4233,6 +4240,13 @@
   <p:clrMapOvr>
     <a:masterClrMapping/>
   </p:clrMapOvr>
+  <p:timing>
+    <p:tnLst>
+      <p:par>
+        <p:cTn xmlns:p14="http://schemas.microsoft.com/office/powerpoint/2010/main" id="1" dur="indefinite" restart="never" nodeType="tmRoot"/>
+      </p:par>
+    </p:tnLst>
+  </p:timing>
 </p:sld>
 </file>
 
@@ -6590,6 +6604,13 @@
   <p:clrMapOvr>
     <a:masterClrMapping/>
   </p:clrMapOvr>
+  <p:timing>
+    <p:tnLst>
+      <p:par>
+        <p:cTn xmlns:p14="http://schemas.microsoft.com/office/powerpoint/2010/main" id="1" dur="indefinite" restart="never" nodeType="tmRoot"/>
+      </p:par>
+    </p:tnLst>
+  </p:timing>
 </p:sld>
 </file>
 

</xml_diff>